<commit_message>
Week 7 final slides/week 8 draft
</commit_message>
<xml_diff>
--- a/COMP2x0-portfolio-workshop-07.pptx
+++ b/COMP2x0-portfolio-workshop-07.pptx
@@ -589,7 +589,7 @@
           <a:p>
             <a:fld id="{EA0C0817-A112-4847-8014-A94B7D2A4EA3}" type="datetime1">
               <a:rPr lang="en-US" smtClean="0"/>
-              <a:t>2/29/2020</a:t>
+              <a:t>3/1/2020</a:t>
             </a:fld>
             <a:endParaRPr lang="en-US" dirty="0"/>
           </a:p>
@@ -791,7 +791,7 @@
           <a:p>
             <a:fld id="{134F40B7-36AB-4376-BE14-EF7004D79BB9}" type="datetime1">
               <a:rPr lang="en-US" smtClean="0"/>
-              <a:t>2/29/2020</a:t>
+              <a:t>3/1/2020</a:t>
             </a:fld>
             <a:endParaRPr lang="en-US"/>
           </a:p>
@@ -971,7 +971,7 @@
           <a:p>
             <a:fld id="{FF87CAB8-DCAE-46A5-AADA-B3FAD11A54E0}" type="datetime1">
               <a:rPr lang="en-US" smtClean="0"/>
-              <a:t>2/29/2020</a:t>
+              <a:t>3/1/2020</a:t>
             </a:fld>
             <a:endParaRPr lang="en-US"/>
           </a:p>
@@ -1141,7 +1141,7 @@
           <a:p>
             <a:fld id="{7332B432-ACDA-4023-A761-2BAB76577B62}" type="datetime1">
               <a:rPr lang="en-US" smtClean="0"/>
-              <a:t>2/29/2020</a:t>
+              <a:t>3/1/2020</a:t>
             </a:fld>
             <a:endParaRPr lang="en-US"/>
           </a:p>
@@ -1740,7 +1740,7 @@
           <a:p>
             <a:fld id="{D9C646AA-F36E-4540-911D-FFFC0A0EF24A}" type="datetime1">
               <a:rPr lang="en-US" smtClean="0"/>
-              <a:t>2/29/2020</a:t>
+              <a:t>3/1/2020</a:t>
             </a:fld>
             <a:endParaRPr lang="en-US" dirty="0"/>
           </a:p>
@@ -2060,7 +2060,7 @@
           <a:p>
             <a:fld id="{69186D26-FA5F-4637-B602-B7C2DC34CFD4}" type="datetime1">
               <a:rPr lang="en-US" smtClean="0"/>
-              <a:t>2/29/2020</a:t>
+              <a:t>3/1/2020</a:t>
             </a:fld>
             <a:endParaRPr lang="en-US"/>
           </a:p>
@@ -2497,7 +2497,7 @@
           <a:p>
             <a:fld id="{8A7F15D8-96D1-4781-BC50-CA8A088B2FE4}" type="datetime1">
               <a:rPr lang="en-US" smtClean="0"/>
-              <a:t>2/29/2020</a:t>
+              <a:t>3/1/2020</a:t>
             </a:fld>
             <a:endParaRPr lang="en-US"/>
           </a:p>
@@ -2615,7 +2615,7 @@
           <a:p>
             <a:fld id="{F9A96C99-B8F8-4528-BD05-0E16E943DC09}" type="datetime1">
               <a:rPr lang="en-US" smtClean="0"/>
-              <a:t>2/29/2020</a:t>
+              <a:t>3/1/2020</a:t>
             </a:fld>
             <a:endParaRPr lang="en-US"/>
           </a:p>
@@ -2710,7 +2710,7 @@
           <a:p>
             <a:fld id="{03636942-C211-4B28-8DBD-C953E00AF71B}" type="datetime1">
               <a:rPr lang="en-US" smtClean="0"/>
-              <a:t>2/29/2020</a:t>
+              <a:t>3/1/2020</a:t>
             </a:fld>
             <a:endParaRPr lang="en-US"/>
           </a:p>
@@ -3127,7 +3127,7 @@
           <a:p>
             <a:fld id="{7E8D12A6-918A-48BD-8CB9-CA713993B0EA}" type="datetime1">
               <a:rPr lang="en-US" smtClean="0"/>
-              <a:t>2/29/2020</a:t>
+              <a:t>3/1/2020</a:t>
             </a:fld>
             <a:endParaRPr lang="en-US"/>
           </a:p>
@@ -3389,7 +3389,7 @@
             <a:fld id="{E778CE86-875F-4587-BCF6-FA054AFC0D53}" type="datetime1">
               <a:rPr lang="en-US" smtClean="0"/>
               <a:pPr/>
-              <a:t>2/29/2020</a:t>
+              <a:t>3/1/2020</a:t>
             </a:fld>
             <a:endParaRPr lang="en-US" dirty="0"/>
           </a:p>
@@ -3905,7 +3905,7 @@
           <a:p>
             <a:fld id="{F6FA2B21-3FCD-4721-B95C-427943F61125}" type="datetime1">
               <a:rPr lang="en-US" smtClean="0"/>
-              <a:t>2/29/2020</a:t>
+              <a:t>3/1/2020</a:t>
             </a:fld>
             <a:endParaRPr lang="en-US"/>
           </a:p>
@@ -8418,8 +8418,13 @@
             </a:pPr>
             <a:r>
               <a:rPr lang="en-GB" sz="2400" dirty="0"/>
-              <a:t>Continue work on your poster.</a:t>
-            </a:r>
+              <a:t>Continue work on </a:t>
+            </a:r>
+            <a:r>
+              <a:rPr lang="en-GB" sz="2400"/>
+              <a:t>your poster (see week 5 slides for tips).</a:t>
+            </a:r>
+            <a:endParaRPr lang="en-GB" sz="2400" dirty="0"/>
           </a:p>
           <a:p>
             <a:pPr marL="514350" indent="-514350">

</xml_diff>